<commit_message>
séparation tendances et recherche
</commit_message>
<xml_diff>
--- a/doc/LIFPROJET_Diapo.pptx
+++ b/doc/LIFPROJET_Diapo.pptx
@@ -4926,7 +4926,7 @@
           </a:ln>
           <a:extLst>
             <a:ext uri="{C572A759-6A51-4108-AA02-DFA0A04FC94B}">
-              <ma14:wrappingTextBoxFlag xmlns:ma14="http://schemas.microsoft.com/office/mac/drawingml/2011/main" xmlns:a14="http://schemas.microsoft.com/office/drawing/2010/main" xmlns:m="http://schemas.openxmlformats.org/officeDocument/2006/math" xmlns="" val="1"/>
+              <ma14:wrappingTextBoxFlag xmlns="" xmlns:m="http://schemas.openxmlformats.org/officeDocument/2006/math" xmlns:a14="http://schemas.microsoft.com/office/drawing/2010/main" xmlns:ma14="http://schemas.microsoft.com/office/mac/drawingml/2011/main" val="1"/>
             </a:ext>
           </a:extLst>
         </p:spPr>
@@ -4991,7 +4991,7 @@
           </a:ln>
           <a:extLst>
             <a:ext uri="{C572A759-6A51-4108-AA02-DFA0A04FC94B}">
-              <ma14:wrappingTextBoxFlag xmlns:ma14="http://schemas.microsoft.com/office/mac/drawingml/2011/main" xmlns:a14="http://schemas.microsoft.com/office/drawing/2010/main" xmlns:m="http://schemas.openxmlformats.org/officeDocument/2006/math" xmlns="" val="1"/>
+              <ma14:wrappingTextBoxFlag xmlns="" xmlns:m="http://schemas.openxmlformats.org/officeDocument/2006/math" xmlns:a14="http://schemas.microsoft.com/office/drawing/2010/main" xmlns:ma14="http://schemas.microsoft.com/office/mac/drawingml/2011/main" val="1"/>
             </a:ext>
           </a:extLst>
         </p:spPr>
@@ -5073,7 +5073,7 @@
           </a:ln>
           <a:extLst>
             <a:ext uri="{C572A759-6A51-4108-AA02-DFA0A04FC94B}">
-              <ma14:wrappingTextBoxFlag xmlns:ma14="http://schemas.microsoft.com/office/mac/drawingml/2011/main" xmlns:a14="http://schemas.microsoft.com/office/drawing/2010/main" xmlns:m="http://schemas.openxmlformats.org/officeDocument/2006/math" xmlns="" val="1"/>
+              <ma14:wrappingTextBoxFlag xmlns="" xmlns:m="http://schemas.openxmlformats.org/officeDocument/2006/math" xmlns:a14="http://schemas.microsoft.com/office/drawing/2010/main" xmlns:ma14="http://schemas.microsoft.com/office/mac/drawingml/2011/main" val="1"/>
             </a:ext>
           </a:extLst>
         </p:spPr>
@@ -5291,7 +5291,7 @@
           </a:ln>
           <a:extLst>
             <a:ext uri="{C572A759-6A51-4108-AA02-DFA0A04FC94B}">
-              <ma14:wrappingTextBoxFlag xmlns:ma14="http://schemas.microsoft.com/office/mac/drawingml/2011/main" xmlns:a14="http://schemas.microsoft.com/office/drawing/2010/main" xmlns:m="http://schemas.openxmlformats.org/officeDocument/2006/math" xmlns="" val="1"/>
+              <ma14:wrappingTextBoxFlag xmlns="" xmlns:m="http://schemas.openxmlformats.org/officeDocument/2006/math" xmlns:a14="http://schemas.microsoft.com/office/drawing/2010/main" xmlns:ma14="http://schemas.microsoft.com/office/mac/drawingml/2011/main" val="1"/>
             </a:ext>
           </a:extLst>
         </p:spPr>
@@ -5339,7 +5339,7 @@
           </a:ln>
           <a:extLst>
             <a:ext uri="{C572A759-6A51-4108-AA02-DFA0A04FC94B}">
-              <ma14:wrappingTextBoxFlag xmlns:ma14="http://schemas.microsoft.com/office/mac/drawingml/2011/main" xmlns:a14="http://schemas.microsoft.com/office/drawing/2010/main" xmlns:m="http://schemas.openxmlformats.org/officeDocument/2006/math" xmlns="" val="1"/>
+              <ma14:wrappingTextBoxFlag xmlns="" xmlns:m="http://schemas.openxmlformats.org/officeDocument/2006/math" xmlns:a14="http://schemas.microsoft.com/office/drawing/2010/main" xmlns:ma14="http://schemas.microsoft.com/office/mac/drawingml/2011/main" val="1"/>
             </a:ext>
           </a:extLst>
         </p:spPr>
@@ -5525,7 +5525,7 @@
           </a:ln>
           <a:extLst>
             <a:ext uri="{C572A759-6A51-4108-AA02-DFA0A04FC94B}">
-              <ma14:wrappingTextBoxFlag xmlns:ma14="http://schemas.microsoft.com/office/mac/drawingml/2011/main" xmlns:a14="http://schemas.microsoft.com/office/drawing/2010/main" xmlns:m="http://schemas.openxmlformats.org/officeDocument/2006/math" xmlns="" val="1"/>
+              <ma14:wrappingTextBoxFlag xmlns="" xmlns:m="http://schemas.openxmlformats.org/officeDocument/2006/math" xmlns:a14="http://schemas.microsoft.com/office/drawing/2010/main" xmlns:ma14="http://schemas.microsoft.com/office/mac/drawingml/2011/main" val="1"/>
             </a:ext>
           </a:extLst>
         </p:spPr>
@@ -5663,7 +5663,7 @@
           </a:ln>
           <a:extLst>
             <a:ext uri="{C572A759-6A51-4108-AA02-DFA0A04FC94B}">
-              <ma14:wrappingTextBoxFlag xmlns:ma14="http://schemas.microsoft.com/office/mac/drawingml/2011/main" xmlns:a14="http://schemas.microsoft.com/office/drawing/2010/main" xmlns:m="http://schemas.openxmlformats.org/officeDocument/2006/math" xmlns="" val="1"/>
+              <ma14:wrappingTextBoxFlag xmlns="" xmlns:m="http://schemas.openxmlformats.org/officeDocument/2006/math" xmlns:a14="http://schemas.microsoft.com/office/drawing/2010/main" xmlns:ma14="http://schemas.microsoft.com/office/mac/drawingml/2011/main" val="1"/>
             </a:ext>
           </a:extLst>
         </p:spPr>
@@ -5938,7 +5938,7 @@
           </a:ln>
           <a:extLst>
             <a:ext uri="{C572A759-6A51-4108-AA02-DFA0A04FC94B}">
-              <ma14:wrappingTextBoxFlag xmlns:ma14="http://schemas.microsoft.com/office/mac/drawingml/2011/main" xmlns:a14="http://schemas.microsoft.com/office/drawing/2010/main" xmlns:m="http://schemas.openxmlformats.org/officeDocument/2006/math" xmlns="" val="1"/>
+              <ma14:wrappingTextBoxFlag xmlns="" xmlns:m="http://schemas.openxmlformats.org/officeDocument/2006/math" xmlns:a14="http://schemas.microsoft.com/office/drawing/2010/main" xmlns:ma14="http://schemas.microsoft.com/office/mac/drawingml/2011/main" val="1"/>
             </a:ext>
           </a:extLst>
         </p:spPr>
@@ -5993,7 +5993,7 @@
           </a:ln>
           <a:extLst>
             <a:ext uri="{C572A759-6A51-4108-AA02-DFA0A04FC94B}">
-              <ma14:wrappingTextBoxFlag xmlns:ma14="http://schemas.microsoft.com/office/mac/drawingml/2011/main" xmlns:a14="http://schemas.microsoft.com/office/drawing/2010/main" xmlns:m="http://schemas.openxmlformats.org/officeDocument/2006/math" xmlns="" val="1"/>
+              <ma14:wrappingTextBoxFlag xmlns="" xmlns:m="http://schemas.openxmlformats.org/officeDocument/2006/math" xmlns:a14="http://schemas.microsoft.com/office/drawing/2010/main" xmlns:ma14="http://schemas.microsoft.com/office/mac/drawingml/2011/main" val="1"/>
             </a:ext>
           </a:extLst>
         </p:spPr>
@@ -6186,7 +6186,7 @@
           </a:ln>
           <a:extLst>
             <a:ext uri="{C572A759-6A51-4108-AA02-DFA0A04FC94B}">
-              <ma14:wrappingTextBoxFlag xmlns="" xmlns:m="http://schemas.openxmlformats.org/officeDocument/2006/math" xmlns:a14="http://schemas.microsoft.com/office/drawing/2010/main" xmlns:ma14="http://schemas.microsoft.com/office/mac/drawingml/2011/main" val="1"/>
+              <ma14:wrappingTextBoxFlag xmlns:ma14="http://schemas.microsoft.com/office/mac/drawingml/2011/main" xmlns:a14="http://schemas.microsoft.com/office/drawing/2010/main" xmlns:m="http://schemas.openxmlformats.org/officeDocument/2006/math" xmlns="" val="1"/>
             </a:ext>
           </a:extLst>
         </p:spPr>
@@ -6241,7 +6241,7 @@
           </a:ln>
           <a:extLst>
             <a:ext uri="{C572A759-6A51-4108-AA02-DFA0A04FC94B}">
-              <ma14:wrappingTextBoxFlag xmlns:ma14="http://schemas.microsoft.com/office/mac/drawingml/2011/main" xmlns:a14="http://schemas.microsoft.com/office/drawing/2010/main" xmlns:m="http://schemas.openxmlformats.org/officeDocument/2006/math" xmlns="" val="1"/>
+              <ma14:wrappingTextBoxFlag xmlns="" xmlns:m="http://schemas.openxmlformats.org/officeDocument/2006/math" xmlns:a14="http://schemas.microsoft.com/office/drawing/2010/main" xmlns:ma14="http://schemas.microsoft.com/office/mac/drawingml/2011/main" val="1"/>
             </a:ext>
           </a:extLst>
         </p:spPr>
@@ -6377,7 +6377,7 @@
           </a:ln>
           <a:extLst>
             <a:ext uri="{C572A759-6A51-4108-AA02-DFA0A04FC94B}">
-              <ma14:wrappingTextBoxFlag xmlns:ma14="http://schemas.microsoft.com/office/mac/drawingml/2011/main" xmlns:a14="http://schemas.microsoft.com/office/drawing/2010/main" xmlns:m="http://schemas.openxmlformats.org/officeDocument/2006/math" xmlns="" val="1"/>
+              <ma14:wrappingTextBoxFlag xmlns="" xmlns:m="http://schemas.openxmlformats.org/officeDocument/2006/math" xmlns:a14="http://schemas.microsoft.com/office/drawing/2010/main" xmlns:ma14="http://schemas.microsoft.com/office/mac/drawingml/2011/main" val="1"/>
             </a:ext>
           </a:extLst>
         </p:spPr>
@@ -6478,7 +6478,7 @@
           </a:ln>
           <a:extLst>
             <a:ext uri="{C572A759-6A51-4108-AA02-DFA0A04FC94B}">
-              <ma14:wrappingTextBoxFlag xmlns:ma14="http://schemas.microsoft.com/office/mac/drawingml/2011/main" xmlns:a14="http://schemas.microsoft.com/office/drawing/2010/main" xmlns:m="http://schemas.openxmlformats.org/officeDocument/2006/math" xmlns="" val="1"/>
+              <ma14:wrappingTextBoxFlag xmlns="" xmlns:m="http://schemas.openxmlformats.org/officeDocument/2006/math" xmlns:a14="http://schemas.microsoft.com/office/drawing/2010/main" xmlns:ma14="http://schemas.microsoft.com/office/mac/drawingml/2011/main" val="1"/>
             </a:ext>
           </a:extLst>
         </p:spPr>
@@ -6533,7 +6533,7 @@
           </a:ln>
           <a:extLst>
             <a:ext uri="{C572A759-6A51-4108-AA02-DFA0A04FC94B}">
-              <ma14:wrappingTextBoxFlag xmlns:ma14="http://schemas.microsoft.com/office/mac/drawingml/2011/main" xmlns:a14="http://schemas.microsoft.com/office/drawing/2010/main" xmlns:m="http://schemas.openxmlformats.org/officeDocument/2006/math" xmlns="" val="1"/>
+              <ma14:wrappingTextBoxFlag xmlns="" xmlns:m="http://schemas.openxmlformats.org/officeDocument/2006/math" xmlns:a14="http://schemas.microsoft.com/office/drawing/2010/main" xmlns:ma14="http://schemas.microsoft.com/office/mac/drawingml/2011/main" val="1"/>
             </a:ext>
           </a:extLst>
         </p:spPr>
@@ -6620,7 +6620,7 @@
           </a:ln>
           <a:extLst>
             <a:ext uri="{C572A759-6A51-4108-AA02-DFA0A04FC94B}">
-              <ma14:wrappingTextBoxFlag xmlns:ma14="http://schemas.microsoft.com/office/mac/drawingml/2011/main" xmlns:a14="http://schemas.microsoft.com/office/drawing/2010/main" xmlns:m="http://schemas.openxmlformats.org/officeDocument/2006/math" xmlns="" val="1"/>
+              <ma14:wrappingTextBoxFlag xmlns="" xmlns:m="http://schemas.openxmlformats.org/officeDocument/2006/math" xmlns:a14="http://schemas.microsoft.com/office/drawing/2010/main" xmlns:ma14="http://schemas.microsoft.com/office/mac/drawingml/2011/main" val="1"/>
             </a:ext>
           </a:extLst>
         </p:spPr>
@@ -6679,7 +6679,7 @@
           </a:ln>
           <a:extLst>
             <a:ext uri="{C572A759-6A51-4108-AA02-DFA0A04FC94B}">
-              <ma14:wrappingTextBoxFlag xmlns:ma14="http://schemas.microsoft.com/office/mac/drawingml/2011/main" xmlns:a14="http://schemas.microsoft.com/office/drawing/2010/main" xmlns:m="http://schemas.openxmlformats.org/officeDocument/2006/math" xmlns="" val="1"/>
+              <ma14:wrappingTextBoxFlag xmlns="" xmlns:m="http://schemas.openxmlformats.org/officeDocument/2006/math" xmlns:a14="http://schemas.microsoft.com/office/drawing/2010/main" xmlns:ma14="http://schemas.microsoft.com/office/mac/drawingml/2011/main" val="1"/>
             </a:ext>
           </a:extLst>
         </p:spPr>
@@ -6728,7 +6728,7 @@
           </a:ln>
           <a:extLst>
             <a:ext uri="{C572A759-6A51-4108-AA02-DFA0A04FC94B}">
-              <ma14:wrappingTextBoxFlag xmlns:ma14="http://schemas.microsoft.com/office/mac/drawingml/2011/main" xmlns:a14="http://schemas.microsoft.com/office/drawing/2010/main" xmlns:m="http://schemas.openxmlformats.org/officeDocument/2006/math" xmlns="" val="1"/>
+              <ma14:wrappingTextBoxFlag xmlns="" xmlns:m="http://schemas.openxmlformats.org/officeDocument/2006/math" xmlns:a14="http://schemas.microsoft.com/office/drawing/2010/main" xmlns:ma14="http://schemas.microsoft.com/office/mac/drawingml/2011/main" val="1"/>
             </a:ext>
           </a:extLst>
         </p:spPr>
@@ -6777,7 +6777,7 @@
           </a:ln>
           <a:extLst>
             <a:ext uri="{C572A759-6A51-4108-AA02-DFA0A04FC94B}">
-              <ma14:wrappingTextBoxFlag xmlns:ma14="http://schemas.microsoft.com/office/mac/drawingml/2011/main" xmlns:a14="http://schemas.microsoft.com/office/drawing/2010/main" xmlns:m="http://schemas.openxmlformats.org/officeDocument/2006/math" xmlns="" val="1"/>
+              <ma14:wrappingTextBoxFlag xmlns="" xmlns:m="http://schemas.openxmlformats.org/officeDocument/2006/math" xmlns:a14="http://schemas.microsoft.com/office/drawing/2010/main" xmlns:ma14="http://schemas.microsoft.com/office/mac/drawingml/2011/main" val="1"/>
             </a:ext>
           </a:extLst>
         </p:spPr>
@@ -6826,7 +6826,7 @@
           </a:ln>
           <a:extLst>
             <a:ext uri="{C572A759-6A51-4108-AA02-DFA0A04FC94B}">
-              <ma14:wrappingTextBoxFlag xmlns:ma14="http://schemas.microsoft.com/office/mac/drawingml/2011/main" xmlns:a14="http://schemas.microsoft.com/office/drawing/2010/main" xmlns:m="http://schemas.openxmlformats.org/officeDocument/2006/math" xmlns="" val="1"/>
+              <ma14:wrappingTextBoxFlag xmlns="" xmlns:m="http://schemas.openxmlformats.org/officeDocument/2006/math" xmlns:a14="http://schemas.microsoft.com/office/drawing/2010/main" xmlns:ma14="http://schemas.microsoft.com/office/mac/drawingml/2011/main" val="1"/>
             </a:ext>
           </a:extLst>
         </p:spPr>
@@ -6880,7 +6880,7 @@
           </a:ln>
           <a:extLst>
             <a:ext uri="{C572A759-6A51-4108-AA02-DFA0A04FC94B}">
-              <ma14:wrappingTextBoxFlag xmlns:ma14="http://schemas.microsoft.com/office/mac/drawingml/2011/main" xmlns:a14="http://schemas.microsoft.com/office/drawing/2010/main" xmlns:m="http://schemas.openxmlformats.org/officeDocument/2006/math" xmlns="" val="1"/>
+              <ma14:wrappingTextBoxFlag xmlns="" xmlns:m="http://schemas.openxmlformats.org/officeDocument/2006/math" xmlns:a14="http://schemas.microsoft.com/office/drawing/2010/main" xmlns:ma14="http://schemas.microsoft.com/office/mac/drawingml/2011/main" val="1"/>
             </a:ext>
           </a:extLst>
         </p:spPr>
@@ -6951,7 +6951,7 @@
           </a:ln>
           <a:extLst>
             <a:ext uri="{C572A759-6A51-4108-AA02-DFA0A04FC94B}">
-              <ma14:wrappingTextBoxFlag xmlns:ma14="http://schemas.microsoft.com/office/mac/drawingml/2011/main" xmlns:a14="http://schemas.microsoft.com/office/drawing/2010/main" xmlns:m="http://schemas.openxmlformats.org/officeDocument/2006/math" xmlns="" val="1"/>
+              <ma14:wrappingTextBoxFlag xmlns="" xmlns:m="http://schemas.openxmlformats.org/officeDocument/2006/math" xmlns:a14="http://schemas.microsoft.com/office/drawing/2010/main" xmlns:ma14="http://schemas.microsoft.com/office/mac/drawingml/2011/main" val="1"/>
             </a:ext>
           </a:extLst>
         </p:spPr>
@@ -7022,7 +7022,7 @@
           </a:ln>
           <a:extLst>
             <a:ext uri="{C572A759-6A51-4108-AA02-DFA0A04FC94B}">
-              <ma14:wrappingTextBoxFlag xmlns:ma14="http://schemas.microsoft.com/office/mac/drawingml/2011/main" xmlns:a14="http://schemas.microsoft.com/office/drawing/2010/main" xmlns:m="http://schemas.openxmlformats.org/officeDocument/2006/math" xmlns="" val="1"/>
+              <ma14:wrappingTextBoxFlag xmlns="" xmlns:m="http://schemas.openxmlformats.org/officeDocument/2006/math" xmlns:a14="http://schemas.microsoft.com/office/drawing/2010/main" xmlns:ma14="http://schemas.microsoft.com/office/mac/drawingml/2011/main" val="1"/>
             </a:ext>
           </a:extLst>
         </p:spPr>
@@ -7236,7 +7236,7 @@
           </a:ln>
           <a:extLst>
             <a:ext uri="{C572A759-6A51-4108-AA02-DFA0A04FC94B}">
-              <ma14:wrappingTextBoxFlag xmlns:ma14="http://schemas.microsoft.com/office/mac/drawingml/2011/main" xmlns:a14="http://schemas.microsoft.com/office/drawing/2010/main" xmlns:m="http://schemas.openxmlformats.org/officeDocument/2006/math" xmlns="" val="1"/>
+              <ma14:wrappingTextBoxFlag xmlns="" xmlns:m="http://schemas.openxmlformats.org/officeDocument/2006/math" xmlns:a14="http://schemas.microsoft.com/office/drawing/2010/main" xmlns:ma14="http://schemas.microsoft.com/office/mac/drawingml/2011/main" val="1"/>
             </a:ext>
           </a:extLst>
         </p:spPr>
@@ -7284,7 +7284,7 @@
           </a:ln>
           <a:extLst>
             <a:ext uri="{C572A759-6A51-4108-AA02-DFA0A04FC94B}">
-              <ma14:wrappingTextBoxFlag xmlns:ma14="http://schemas.microsoft.com/office/mac/drawingml/2011/main" xmlns:a14="http://schemas.microsoft.com/office/drawing/2010/main" xmlns:m="http://schemas.openxmlformats.org/officeDocument/2006/math" xmlns="" val="1"/>
+              <ma14:wrappingTextBoxFlag xmlns="" xmlns:m="http://schemas.openxmlformats.org/officeDocument/2006/math" xmlns:a14="http://schemas.microsoft.com/office/drawing/2010/main" xmlns:ma14="http://schemas.microsoft.com/office/mac/drawingml/2011/main" val="1"/>
             </a:ext>
           </a:extLst>
         </p:spPr>
@@ -7471,7 +7471,7 @@
           </a:ln>
           <a:extLst>
             <a:ext uri="{C572A759-6A51-4108-AA02-DFA0A04FC94B}">
-              <ma14:wrappingTextBoxFlag xmlns:ma14="http://schemas.microsoft.com/office/mac/drawingml/2011/main" xmlns:a14="http://schemas.microsoft.com/office/drawing/2010/main" xmlns:m="http://schemas.openxmlformats.org/officeDocument/2006/math" xmlns="" val="1"/>
+              <ma14:wrappingTextBoxFlag xmlns="" xmlns:m="http://schemas.openxmlformats.org/officeDocument/2006/math" xmlns:a14="http://schemas.microsoft.com/office/drawing/2010/main" xmlns:ma14="http://schemas.microsoft.com/office/mac/drawingml/2011/main" val="1"/>
             </a:ext>
           </a:extLst>
         </p:spPr>
@@ -7610,7 +7610,7 @@
           </a:ln>
           <a:extLst>
             <a:ext uri="{C572A759-6A51-4108-AA02-DFA0A04FC94B}">
-              <ma14:wrappingTextBoxFlag xmlns:ma14="http://schemas.microsoft.com/office/mac/drawingml/2011/main" xmlns:a14="http://schemas.microsoft.com/office/drawing/2010/main" xmlns:m="http://schemas.openxmlformats.org/officeDocument/2006/math" xmlns="" val="1"/>
+              <ma14:wrappingTextBoxFlag xmlns="" xmlns:m="http://schemas.openxmlformats.org/officeDocument/2006/math" xmlns:a14="http://schemas.microsoft.com/office/drawing/2010/main" xmlns:ma14="http://schemas.microsoft.com/office/mac/drawingml/2011/main" val="1"/>
             </a:ext>
           </a:extLst>
         </p:spPr>
@@ -7749,7 +7749,7 @@
           </a:ln>
           <a:extLst>
             <a:ext uri="{C572A759-6A51-4108-AA02-DFA0A04FC94B}">
-              <ma14:wrappingTextBoxFlag xmlns:ma14="http://schemas.microsoft.com/office/mac/drawingml/2011/main" xmlns:a14="http://schemas.microsoft.com/office/drawing/2010/main" xmlns:m="http://schemas.openxmlformats.org/officeDocument/2006/math" xmlns="" val="1"/>
+              <ma14:wrappingTextBoxFlag xmlns="" xmlns:m="http://schemas.openxmlformats.org/officeDocument/2006/math" xmlns:a14="http://schemas.microsoft.com/office/drawing/2010/main" xmlns:ma14="http://schemas.microsoft.com/office/mac/drawingml/2011/main" val="1"/>
             </a:ext>
           </a:extLst>
         </p:spPr>
@@ -7818,7 +7818,7 @@
           </a:ln>
           <a:extLst>
             <a:ext uri="{C572A759-6A51-4108-AA02-DFA0A04FC94B}">
-              <ma14:wrappingTextBoxFlag xmlns:ma14="http://schemas.microsoft.com/office/mac/drawingml/2011/main" xmlns:a14="http://schemas.microsoft.com/office/drawing/2010/main" xmlns:m="http://schemas.openxmlformats.org/officeDocument/2006/math" xmlns="" val="1"/>
+              <ma14:wrappingTextBoxFlag xmlns="" xmlns:m="http://schemas.openxmlformats.org/officeDocument/2006/math" xmlns:a14="http://schemas.microsoft.com/office/drawing/2010/main" xmlns:ma14="http://schemas.microsoft.com/office/mac/drawingml/2011/main" val="1"/>
             </a:ext>
           </a:extLst>
         </p:spPr>
@@ -7931,7 +7931,7 @@
           </a:ln>
           <a:extLst>
             <a:ext uri="{C572A759-6A51-4108-AA02-DFA0A04FC94B}">
-              <ma14:wrappingTextBoxFlag xmlns:ma14="http://schemas.microsoft.com/office/mac/drawingml/2011/main" xmlns:a14="http://schemas.microsoft.com/office/drawing/2010/main" xmlns:m="http://schemas.openxmlformats.org/officeDocument/2006/math" xmlns="" val="1"/>
+              <ma14:wrappingTextBoxFlag xmlns="" xmlns:m="http://schemas.openxmlformats.org/officeDocument/2006/math" xmlns:a14="http://schemas.microsoft.com/office/drawing/2010/main" xmlns:ma14="http://schemas.microsoft.com/office/mac/drawingml/2011/main" val="1"/>
             </a:ext>
           </a:extLst>
         </p:spPr>
@@ -8032,7 +8032,7 @@
           </a:ln>
           <a:extLst>
             <a:ext uri="{C572A759-6A51-4108-AA02-DFA0A04FC94B}">
-              <ma14:wrappingTextBoxFlag xmlns:ma14="http://schemas.microsoft.com/office/mac/drawingml/2011/main" xmlns:a14="http://schemas.microsoft.com/office/drawing/2010/main" xmlns:m="http://schemas.openxmlformats.org/officeDocument/2006/math" xmlns="" val="1"/>
+              <ma14:wrappingTextBoxFlag xmlns="" xmlns:m="http://schemas.openxmlformats.org/officeDocument/2006/math" xmlns:a14="http://schemas.microsoft.com/office/drawing/2010/main" xmlns:ma14="http://schemas.microsoft.com/office/mac/drawingml/2011/main" val="1"/>
             </a:ext>
           </a:extLst>
         </p:spPr>
@@ -8202,7 +8202,7 @@
           </a:ln>
           <a:extLst>
             <a:ext uri="{C572A759-6A51-4108-AA02-DFA0A04FC94B}">
-              <ma14:wrappingTextBoxFlag xmlns:ma14="http://schemas.microsoft.com/office/mac/drawingml/2011/main" xmlns:a14="http://schemas.microsoft.com/office/drawing/2010/main" xmlns:m="http://schemas.openxmlformats.org/officeDocument/2006/math" xmlns="" val="1"/>
+              <ma14:wrappingTextBoxFlag xmlns="" xmlns:m="http://schemas.openxmlformats.org/officeDocument/2006/math" xmlns:a14="http://schemas.microsoft.com/office/drawing/2010/main" xmlns:ma14="http://schemas.microsoft.com/office/mac/drawingml/2011/main" val="1"/>
             </a:ext>
           </a:extLst>
         </p:spPr>
@@ -8363,6 +8363,232 @@
           </a:p>
         </p:txBody>
       </p:sp>
+      <p:pic>
+        <p:nvPicPr>
+          <p:cNvPr id="4" name="Image 3">
+            <a:extLst>
+              <a:ext uri="{FF2B5EF4-FFF2-40B4-BE49-F238E27FC236}">
+                <a16:creationId xmlns:a16="http://schemas.microsoft.com/office/drawing/2014/main" id="{9F02AFFD-C04B-DDCD-ADE7-10648BD1A5B9}"/>
+              </a:ext>
+            </a:extLst>
+          </p:cNvPr>
+          <p:cNvPicPr>
+            <a:picLocks noChangeAspect="1"/>
+          </p:cNvPicPr>
+          <p:nvPr/>
+        </p:nvPicPr>
+        <p:blipFill>
+          <a:blip r:embed="rId2"/>
+          <a:stretch>
+            <a:fillRect/>
+          </a:stretch>
+        </p:blipFill>
+        <p:spPr>
+          <a:xfrm>
+            <a:off x="12537831" y="4183239"/>
+            <a:ext cx="9793166" cy="7507320"/>
+          </a:xfrm>
+          <a:prstGeom prst="rect">
+            <a:avLst/>
+          </a:prstGeom>
+        </p:spPr>
+      </p:pic>
+      <p:pic>
+        <p:nvPicPr>
+          <p:cNvPr id="6" name="Image 5">
+            <a:extLst>
+              <a:ext uri="{FF2B5EF4-FFF2-40B4-BE49-F238E27FC236}">
+                <a16:creationId xmlns:a16="http://schemas.microsoft.com/office/drawing/2014/main" id="{FE77A853-7B30-BE31-3BDA-8F398BEED5D1}"/>
+              </a:ext>
+            </a:extLst>
+          </p:cNvPr>
+          <p:cNvPicPr>
+            <a:picLocks noChangeAspect="1"/>
+          </p:cNvPicPr>
+          <p:nvPr/>
+        </p:nvPicPr>
+        <p:blipFill>
+          <a:blip r:embed="rId3"/>
+          <a:stretch>
+            <a:fillRect/>
+          </a:stretch>
+        </p:blipFill>
+        <p:spPr>
+          <a:xfrm>
+            <a:off x="2683279" y="3335366"/>
+            <a:ext cx="8496872" cy="8534249"/>
+          </a:xfrm>
+          <a:prstGeom prst="rect">
+            <a:avLst/>
+          </a:prstGeom>
+        </p:spPr>
+      </p:pic>
+      <p:sp>
+        <p:nvSpPr>
+          <p:cNvPr id="9" name="ZoneTexte 8">
+            <a:extLst>
+              <a:ext uri="{FF2B5EF4-FFF2-40B4-BE49-F238E27FC236}">
+                <a16:creationId xmlns:a16="http://schemas.microsoft.com/office/drawing/2014/main" id="{5CC8784E-F54A-44DD-FEF0-B4A525DEDA6B}"/>
+              </a:ext>
+            </a:extLst>
+          </p:cNvPr>
+          <p:cNvSpPr txBox="1"/>
+          <p:nvPr/>
+        </p:nvSpPr>
+        <p:spPr>
+          <a:xfrm>
+            <a:off x="5676439" y="12221161"/>
+            <a:ext cx="1888338" cy="656590"/>
+          </a:xfrm>
+          <a:prstGeom prst="rect">
+            <a:avLst/>
+          </a:prstGeom>
+          <a:noFill/>
+          <a:ln w="12700" cap="flat">
+            <a:noFill/>
+            <a:miter lim="400000"/>
+          </a:ln>
+          <a:effectLst/>
+          <a:sp3d/>
+        </p:spPr>
+        <p:style>
+          <a:lnRef idx="0">
+            <a:scrgbClr r="0" g="0" b="0"/>
+          </a:lnRef>
+          <a:fillRef idx="0">
+            <a:scrgbClr r="0" g="0" b="0"/>
+          </a:fillRef>
+          <a:effectRef idx="0">
+            <a:scrgbClr r="0" g="0" b="0"/>
+          </a:effectRef>
+          <a:fontRef idx="none"/>
+        </p:style>
+        <p:txBody>
+          <a:bodyPr rot="0" spcFirstLastPara="1" vertOverflow="overflow" horzOverflow="overflow" vert="horz" wrap="none" lIns="50800" tIns="50800" rIns="50800" bIns="50800" numCol="1" spcCol="38100" rtlCol="0" anchor="ctr">
+            <a:spAutoFit/>
+          </a:bodyPr>
+          <a:lstStyle/>
+          <a:p>
+            <a:pPr marL="0" marR="0" indent="0" algn="ctr" defTabSz="825500" rtl="0" fontAlgn="auto" latinLnBrk="0" hangingPunct="0">
+              <a:lnSpc>
+                <a:spcPct val="100000"/>
+              </a:lnSpc>
+              <a:spcBef>
+                <a:spcPts val="0"/>
+              </a:spcBef>
+              <a:spcAft>
+                <a:spcPts val="0"/>
+              </a:spcAft>
+              <a:buClrTx/>
+              <a:buSzTx/>
+              <a:buFontTx/>
+              <a:buNone/>
+              <a:tabLst/>
+            </a:pPr>
+            <a:r>
+              <a:rPr kumimoji="0" lang="fr-FR" sz="3600" b="0" i="0" u="none" strike="noStrike" cap="none" spc="0" normalizeH="0" baseline="0" dirty="0">
+                <a:ln>
+                  <a:noFill/>
+                </a:ln>
+                <a:solidFill>
+                  <a:schemeClr val="bg1">
+                    <a:lumMod val="95000"/>
+                  </a:schemeClr>
+                </a:solidFill>
+                <a:effectLst/>
+                <a:uFillTx/>
+                <a:latin typeface="Poppins Light" panose="00000400000000000000" pitchFamily="2" charset="0"/>
+                <a:cs typeface="Poppins Light" panose="00000400000000000000" pitchFamily="2" charset="0"/>
+                <a:sym typeface="Helvetica Neue"/>
+              </a:rPr>
+              <a:t>Le code</a:t>
+            </a:r>
+          </a:p>
+        </p:txBody>
+      </p:sp>
+      <p:sp>
+        <p:nvSpPr>
+          <p:cNvPr id="10" name="ZoneTexte 9">
+            <a:extLst>
+              <a:ext uri="{FF2B5EF4-FFF2-40B4-BE49-F238E27FC236}">
+                <a16:creationId xmlns:a16="http://schemas.microsoft.com/office/drawing/2014/main" id="{C281A9BF-3BFA-6695-99C2-2F2FAAD670C9}"/>
+              </a:ext>
+            </a:extLst>
+          </p:cNvPr>
+          <p:cNvSpPr txBox="1"/>
+          <p:nvPr/>
+        </p:nvSpPr>
+        <p:spPr>
+          <a:xfrm>
+            <a:off x="16649305" y="12220966"/>
+            <a:ext cx="2058256" cy="656590"/>
+          </a:xfrm>
+          <a:prstGeom prst="rect">
+            <a:avLst/>
+          </a:prstGeom>
+          <a:noFill/>
+          <a:ln w="12700" cap="flat">
+            <a:noFill/>
+            <a:miter lim="400000"/>
+          </a:ln>
+          <a:effectLst/>
+          <a:sp3d/>
+        </p:spPr>
+        <p:style>
+          <a:lnRef idx="0">
+            <a:scrgbClr r="0" g="0" b="0"/>
+          </a:lnRef>
+          <a:fillRef idx="0">
+            <a:scrgbClr r="0" g="0" b="0"/>
+          </a:fillRef>
+          <a:effectRef idx="0">
+            <a:scrgbClr r="0" g="0" b="0"/>
+          </a:effectRef>
+          <a:fontRef idx="none"/>
+        </p:style>
+        <p:txBody>
+          <a:bodyPr rot="0" spcFirstLastPara="1" vertOverflow="overflow" horzOverflow="overflow" vert="horz" wrap="none" lIns="50800" tIns="50800" rIns="50800" bIns="50800" numCol="1" spcCol="38100" rtlCol="0" anchor="ctr">
+            <a:spAutoFit/>
+          </a:bodyPr>
+          <a:lstStyle/>
+          <a:p>
+            <a:pPr marL="0" marR="0" indent="0" algn="ctr" defTabSz="825500" rtl="0" fontAlgn="auto" latinLnBrk="0" hangingPunct="0">
+              <a:lnSpc>
+                <a:spcPct val="100000"/>
+              </a:lnSpc>
+              <a:spcBef>
+                <a:spcPts val="0"/>
+              </a:spcBef>
+              <a:spcAft>
+                <a:spcPts val="0"/>
+              </a:spcAft>
+              <a:buClrTx/>
+              <a:buSzTx/>
+              <a:buFontTx/>
+              <a:buNone/>
+              <a:tabLst/>
+            </a:pPr>
+            <a:r>
+              <a:rPr kumimoji="0" lang="fr-FR" sz="3600" b="0" i="0" u="none" strike="noStrike" cap="none" spc="0" normalizeH="0" baseline="0" dirty="0">
+                <a:ln>
+                  <a:noFill/>
+                </a:ln>
+                <a:solidFill>
+                  <a:schemeClr val="bg1">
+                    <a:lumMod val="95000"/>
+                  </a:schemeClr>
+                </a:solidFill>
+                <a:effectLst/>
+                <a:uFillTx/>
+                <a:latin typeface="Poppins Light" panose="00000400000000000000" pitchFamily="2" charset="0"/>
+                <a:cs typeface="Poppins Light" panose="00000400000000000000" pitchFamily="2" charset="0"/>
+                <a:sym typeface="Helvetica Neue"/>
+              </a:rPr>
+              <a:t>Le rendu</a:t>
+            </a:r>
+          </a:p>
+        </p:txBody>
+      </p:sp>
     </p:spTree>
     <p:extLst>
       <p:ext uri="{BB962C8B-B14F-4D97-AF65-F5344CB8AC3E}">
@@ -8420,7 +8646,7 @@
           </a:ln>
           <a:extLst>
             <a:ext uri="{C572A759-6A51-4108-AA02-DFA0A04FC94B}">
-              <ma14:wrappingTextBoxFlag xmlns:ma14="http://schemas.microsoft.com/office/mac/drawingml/2011/main" xmlns:a14="http://schemas.microsoft.com/office/drawing/2010/main" xmlns:m="http://schemas.openxmlformats.org/officeDocument/2006/math" xmlns="" val="1"/>
+              <ma14:wrappingTextBoxFlag xmlns="" xmlns:m="http://schemas.openxmlformats.org/officeDocument/2006/math" xmlns:a14="http://schemas.microsoft.com/office/drawing/2010/main" xmlns:ma14="http://schemas.microsoft.com/office/mac/drawingml/2011/main" val="1"/>
             </a:ext>
           </a:extLst>
         </p:spPr>
@@ -8864,7 +9090,7 @@
           </a:ln>
           <a:extLst>
             <a:ext uri="{C572A759-6A51-4108-AA02-DFA0A04FC94B}">
-              <ma14:wrappingTextBoxFlag xmlns:ma14="http://schemas.microsoft.com/office/mac/drawingml/2011/main" xmlns:a14="http://schemas.microsoft.com/office/drawing/2010/main" xmlns:m="http://schemas.openxmlformats.org/officeDocument/2006/math" xmlns="" val="1"/>
+              <ma14:wrappingTextBoxFlag xmlns="" xmlns:m="http://schemas.openxmlformats.org/officeDocument/2006/math" xmlns:a14="http://schemas.microsoft.com/office/drawing/2010/main" xmlns:ma14="http://schemas.microsoft.com/office/mac/drawingml/2011/main" val="1"/>
             </a:ext>
           </a:extLst>
         </p:spPr>
@@ -9050,7 +9276,7 @@
           </a:ln>
           <a:extLst>
             <a:ext uri="{C572A759-6A51-4108-AA02-DFA0A04FC94B}">
-              <ma14:wrappingTextBoxFlag xmlns:ma14="http://schemas.microsoft.com/office/mac/drawingml/2011/main" xmlns:a14="http://schemas.microsoft.com/office/drawing/2010/main" xmlns:m="http://schemas.openxmlformats.org/officeDocument/2006/math" xmlns="" val="1"/>
+              <ma14:wrappingTextBoxFlag xmlns="" xmlns:m="http://schemas.openxmlformats.org/officeDocument/2006/math" xmlns:a14="http://schemas.microsoft.com/office/drawing/2010/main" xmlns:ma14="http://schemas.microsoft.com/office/mac/drawingml/2011/main" val="1"/>
             </a:ext>
           </a:extLst>
         </p:spPr>
@@ -9221,7 +9447,7 @@
           </a:ln>
           <a:extLst>
             <a:ext uri="{C572A759-6A51-4108-AA02-DFA0A04FC94B}">
-              <ma14:wrappingTextBoxFlag xmlns:ma14="http://schemas.microsoft.com/office/mac/drawingml/2011/main" xmlns:a14="http://schemas.microsoft.com/office/drawing/2010/main" xmlns:m="http://schemas.openxmlformats.org/officeDocument/2006/math" xmlns="" val="1"/>
+              <ma14:wrappingTextBoxFlag xmlns="" xmlns:m="http://schemas.openxmlformats.org/officeDocument/2006/math" xmlns:a14="http://schemas.microsoft.com/office/drawing/2010/main" xmlns:ma14="http://schemas.microsoft.com/office/mac/drawingml/2011/main" val="1"/>
             </a:ext>
           </a:extLst>
         </p:spPr>
@@ -9439,7 +9665,7 @@
           </a:ln>
           <a:extLst>
             <a:ext uri="{C572A759-6A51-4108-AA02-DFA0A04FC94B}">
-              <ma14:wrappingTextBoxFlag xmlns:ma14="http://schemas.microsoft.com/office/mac/drawingml/2011/main" xmlns:a14="http://schemas.microsoft.com/office/drawing/2010/main" xmlns:m="http://schemas.openxmlformats.org/officeDocument/2006/math" xmlns="" val="1"/>
+              <ma14:wrappingTextBoxFlag xmlns="" xmlns:m="http://schemas.openxmlformats.org/officeDocument/2006/math" xmlns:a14="http://schemas.microsoft.com/office/drawing/2010/main" xmlns:ma14="http://schemas.microsoft.com/office/mac/drawingml/2011/main" val="1"/>
             </a:ext>
           </a:extLst>
         </p:spPr>

</xml_diff>